<commit_message>
updated wireframe, schema.sql and added models
</commit_message>
<xml_diff>
--- a/File documents/Wireframe.pptx
+++ b/File documents/Wireframe.pptx
@@ -7,10 +7,9 @@
   <p:sldIdLst>
     <p:sldId id="256" r:id="rId2"/>
     <p:sldId id="261" r:id="rId3"/>
-    <p:sldId id="257" r:id="rId4"/>
+    <p:sldId id="260" r:id="rId4"/>
     <p:sldId id="259" r:id="rId5"/>
-    <p:sldId id="258" r:id="rId6"/>
-    <p:sldId id="260" r:id="rId7"/>
+    <p:sldId id="262" r:id="rId6"/>
   </p:sldIdLst>
   <p:sldSz cx="12192000" cy="6858000"/>
   <p:notesSz cx="6858000" cy="9144000"/>
@@ -109,6 +108,11 @@
       </a:defRPr>
     </a:lvl9pPr>
   </p:defaultTextStyle>
+  <p:extLst>
+    <p:ext uri="{EFAFB233-063F-42B5-8137-9DF3F51BA10A}">
+      <p15:sldGuideLst xmlns:p15="http://schemas.microsoft.com/office/powerpoint/2012/main"/>
+    </p:ext>
+  </p:extLst>
 </p:presentation>
 </file>
 
@@ -261,7 +265,7 @@
           <a:p>
             <a:fld id="{65349E01-F959-450F-A9F4-AD642B0B28C6}" type="datetimeFigureOut">
               <a:rPr lang="en-AU" smtClean="0"/>
-              <a:t>15/11/2022</a:t>
+              <a:t>17/11/2022</a:t>
             </a:fld>
             <a:endParaRPr lang="en-AU"/>
           </a:p>
@@ -461,7 +465,7 @@
           <a:p>
             <a:fld id="{65349E01-F959-450F-A9F4-AD642B0B28C6}" type="datetimeFigureOut">
               <a:rPr lang="en-AU" smtClean="0"/>
-              <a:t>15/11/2022</a:t>
+              <a:t>17/11/2022</a:t>
             </a:fld>
             <a:endParaRPr lang="en-AU"/>
           </a:p>
@@ -671,7 +675,7 @@
           <a:p>
             <a:fld id="{65349E01-F959-450F-A9F4-AD642B0B28C6}" type="datetimeFigureOut">
               <a:rPr lang="en-AU" smtClean="0"/>
-              <a:t>15/11/2022</a:t>
+              <a:t>17/11/2022</a:t>
             </a:fld>
             <a:endParaRPr lang="en-AU"/>
           </a:p>
@@ -871,7 +875,7 @@
           <a:p>
             <a:fld id="{65349E01-F959-450F-A9F4-AD642B0B28C6}" type="datetimeFigureOut">
               <a:rPr lang="en-AU" smtClean="0"/>
-              <a:t>15/11/2022</a:t>
+              <a:t>17/11/2022</a:t>
             </a:fld>
             <a:endParaRPr lang="en-AU"/>
           </a:p>
@@ -1147,7 +1151,7 @@
           <a:p>
             <a:fld id="{65349E01-F959-450F-A9F4-AD642B0B28C6}" type="datetimeFigureOut">
               <a:rPr lang="en-AU" smtClean="0"/>
-              <a:t>15/11/2022</a:t>
+              <a:t>17/11/2022</a:t>
             </a:fld>
             <a:endParaRPr lang="en-AU"/>
           </a:p>
@@ -1415,7 +1419,7 @@
           <a:p>
             <a:fld id="{65349E01-F959-450F-A9F4-AD642B0B28C6}" type="datetimeFigureOut">
               <a:rPr lang="en-AU" smtClean="0"/>
-              <a:t>15/11/2022</a:t>
+              <a:t>17/11/2022</a:t>
             </a:fld>
             <a:endParaRPr lang="en-AU"/>
           </a:p>
@@ -1830,7 +1834,7 @@
           <a:p>
             <a:fld id="{65349E01-F959-450F-A9F4-AD642B0B28C6}" type="datetimeFigureOut">
               <a:rPr lang="en-AU" smtClean="0"/>
-              <a:t>15/11/2022</a:t>
+              <a:t>17/11/2022</a:t>
             </a:fld>
             <a:endParaRPr lang="en-AU"/>
           </a:p>
@@ -1972,7 +1976,7 @@
           <a:p>
             <a:fld id="{65349E01-F959-450F-A9F4-AD642B0B28C6}" type="datetimeFigureOut">
               <a:rPr lang="en-AU" smtClean="0"/>
-              <a:t>15/11/2022</a:t>
+              <a:t>17/11/2022</a:t>
             </a:fld>
             <a:endParaRPr lang="en-AU"/>
           </a:p>
@@ -2085,7 +2089,7 @@
           <a:p>
             <a:fld id="{65349E01-F959-450F-A9F4-AD642B0B28C6}" type="datetimeFigureOut">
               <a:rPr lang="en-AU" smtClean="0"/>
-              <a:t>15/11/2022</a:t>
+              <a:t>17/11/2022</a:t>
             </a:fld>
             <a:endParaRPr lang="en-AU"/>
           </a:p>
@@ -2398,7 +2402,7 @@
           <a:p>
             <a:fld id="{65349E01-F959-450F-A9F4-AD642B0B28C6}" type="datetimeFigureOut">
               <a:rPr lang="en-AU" smtClean="0"/>
-              <a:t>15/11/2022</a:t>
+              <a:t>17/11/2022</a:t>
             </a:fld>
             <a:endParaRPr lang="en-AU"/>
           </a:p>
@@ -2687,7 +2691,7 @@
           <a:p>
             <a:fld id="{65349E01-F959-450F-A9F4-AD642B0B28C6}" type="datetimeFigureOut">
               <a:rPr lang="en-AU" smtClean="0"/>
-              <a:t>15/11/2022</a:t>
+              <a:t>17/11/2022</a:t>
             </a:fld>
             <a:endParaRPr lang="en-AU"/>
           </a:p>
@@ -2930,7 +2934,7 @@
           <a:p>
             <a:fld id="{65349E01-F959-450F-A9F4-AD642B0B28C6}" type="datetimeFigureOut">
               <a:rPr lang="en-AU" smtClean="0"/>
-              <a:t>15/11/2022</a:t>
+              <a:t>17/11/2022</a:t>
             </a:fld>
             <a:endParaRPr lang="en-AU"/>
           </a:p>
@@ -3455,7 +3459,7 @@
         </p:nvSpPr>
         <p:spPr>
           <a:xfrm>
-            <a:off x="7049937" y="1484545"/>
+            <a:off x="7944204" y="1587456"/>
             <a:ext cx="3232751" cy="369332"/>
           </a:xfrm>
           <a:prstGeom prst="rect">
@@ -3548,7 +3552,7 @@
         </p:nvSpPr>
         <p:spPr>
           <a:xfrm>
-            <a:off x="6840747" y="2096219"/>
+            <a:off x="7203057" y="2061713"/>
             <a:ext cx="2717321" cy="534838"/>
           </a:xfrm>
           <a:prstGeom prst="rect">
@@ -3598,7 +3602,7 @@
         </p:nvSpPr>
         <p:spPr>
           <a:xfrm>
-            <a:off x="6840746" y="3429000"/>
+            <a:off x="7203056" y="3394494"/>
             <a:ext cx="2717321" cy="534838"/>
           </a:xfrm>
           <a:prstGeom prst="rect">
@@ -3648,7 +3652,7 @@
         </p:nvSpPr>
         <p:spPr>
           <a:xfrm>
-            <a:off x="6840746" y="2799271"/>
+            <a:off x="7203056" y="2764765"/>
             <a:ext cx="2717321" cy="437551"/>
           </a:xfrm>
           <a:prstGeom prst="rect">
@@ -3822,8 +3826,8 @@
         </p:nvSpPr>
         <p:spPr>
           <a:xfrm>
-            <a:off x="6849374" y="1159690"/>
-            <a:ext cx="3232751" cy="369332"/>
+            <a:off x="7732142" y="1185345"/>
+            <a:ext cx="1414732" cy="369332"/>
           </a:xfrm>
           <a:prstGeom prst="rect">
             <a:avLst/>
@@ -3915,7 +3919,7 @@
         </p:nvSpPr>
         <p:spPr>
           <a:xfrm>
-            <a:off x="6849374" y="1960544"/>
+            <a:off x="7148212" y="2052801"/>
             <a:ext cx="2717321" cy="369333"/>
           </a:xfrm>
           <a:prstGeom prst="rect">
@@ -3965,7 +3969,7 @@
         </p:nvSpPr>
         <p:spPr>
           <a:xfrm>
-            <a:off x="6840745" y="1519861"/>
+            <a:off x="7139583" y="1612118"/>
             <a:ext cx="2717321" cy="369332"/>
           </a:xfrm>
           <a:prstGeom prst="rect">
@@ -4015,7 +4019,7 @@
         </p:nvSpPr>
         <p:spPr>
           <a:xfrm>
-            <a:off x="6854075" y="2431600"/>
+            <a:off x="7152913" y="2523857"/>
             <a:ext cx="2717321" cy="365409"/>
           </a:xfrm>
           <a:prstGeom prst="rect">
@@ -4053,10 +4057,10 @@
       </p:sp>
       <p:sp>
         <p:nvSpPr>
-          <p:cNvPr id="2" name="Oval 1">
-            <a:extLst>
-              <a:ext uri="{FF2B5EF4-FFF2-40B4-BE49-F238E27FC236}">
-                <a16:creationId xmlns:a16="http://schemas.microsoft.com/office/drawing/2014/main" id="{1C98FF55-F953-60AD-F530-C9A975E4F578}"/>
+          <p:cNvPr id="13" name="Rectangle 12">
+            <a:extLst>
+              <a:ext uri="{FF2B5EF4-FFF2-40B4-BE49-F238E27FC236}">
+                <a16:creationId xmlns:a16="http://schemas.microsoft.com/office/drawing/2014/main" id="{B1F59E71-8F1F-F688-33E5-6A460C2042B7}"/>
               </a:ext>
             </a:extLst>
           </p:cNvPr>
@@ -4065,171 +4069,7 @@
         </p:nvSpPr>
         <p:spPr>
           <a:xfrm>
-            <a:off x="6978770" y="3856008"/>
-            <a:ext cx="189781" cy="204703"/>
-          </a:xfrm>
-          <a:prstGeom prst="ellipse">
-            <a:avLst/>
-          </a:prstGeom>
-        </p:spPr>
-        <p:style>
-          <a:lnRef idx="2">
-            <a:schemeClr val="accent1">
-              <a:shade val="50000"/>
-            </a:schemeClr>
-          </a:lnRef>
-          <a:fillRef idx="1">
-            <a:schemeClr val="accent1"/>
-          </a:fillRef>
-          <a:effectRef idx="0">
-            <a:schemeClr val="accent1"/>
-          </a:effectRef>
-          <a:fontRef idx="minor">
-            <a:schemeClr val="lt1"/>
-          </a:fontRef>
-        </p:style>
-        <p:txBody>
-          <a:bodyPr rtlCol="0" anchor="ctr"/>
-          <a:lstStyle/>
-          <a:p>
-            <a:pPr algn="ctr"/>
-            <a:endParaRPr lang="en-AU"/>
-          </a:p>
-        </p:txBody>
-      </p:sp>
-      <p:sp>
-        <p:nvSpPr>
-          <p:cNvPr id="3" name="TextBox 2">
-            <a:extLst>
-              <a:ext uri="{FF2B5EF4-FFF2-40B4-BE49-F238E27FC236}">
-                <a16:creationId xmlns:a16="http://schemas.microsoft.com/office/drawing/2014/main" id="{FD188025-D4D3-D61B-CC2E-ACA6DD69596D}"/>
-              </a:ext>
-            </a:extLst>
-          </p:cNvPr>
-          <p:cNvSpPr txBox="1"/>
-          <p:nvPr/>
-        </p:nvSpPr>
-        <p:spPr>
-          <a:xfrm>
-            <a:off x="7168551" y="3763521"/>
-            <a:ext cx="1177117" cy="369332"/>
-          </a:xfrm>
-          <a:prstGeom prst="rect">
-            <a:avLst/>
-          </a:prstGeom>
-          <a:noFill/>
-        </p:spPr>
-        <p:txBody>
-          <a:bodyPr wrap="none" rtlCol="0">
-            <a:spAutoFit/>
-          </a:bodyPr>
-          <a:lstStyle/>
-          <a:p>
-            <a:r>
-              <a:rPr lang="en-US" dirty="0"/>
-              <a:t>Freelancer</a:t>
-            </a:r>
-            <a:endParaRPr lang="en-AU" dirty="0"/>
-          </a:p>
-        </p:txBody>
-      </p:sp>
-      <p:sp>
-        <p:nvSpPr>
-          <p:cNvPr id="11" name="Oval 10">
-            <a:extLst>
-              <a:ext uri="{FF2B5EF4-FFF2-40B4-BE49-F238E27FC236}">
-                <a16:creationId xmlns:a16="http://schemas.microsoft.com/office/drawing/2014/main" id="{B017489D-1C86-8E6C-1DD8-1FBC55E7A018}"/>
-              </a:ext>
-            </a:extLst>
-          </p:cNvPr>
-          <p:cNvSpPr/>
-          <p:nvPr/>
-        </p:nvSpPr>
-        <p:spPr>
-          <a:xfrm>
-            <a:off x="8345668" y="3856008"/>
-            <a:ext cx="189781" cy="204703"/>
-          </a:xfrm>
-          <a:prstGeom prst="ellipse">
-            <a:avLst/>
-          </a:prstGeom>
-        </p:spPr>
-        <p:style>
-          <a:lnRef idx="2">
-            <a:schemeClr val="accent1">
-              <a:shade val="50000"/>
-            </a:schemeClr>
-          </a:lnRef>
-          <a:fillRef idx="1">
-            <a:schemeClr val="accent1"/>
-          </a:fillRef>
-          <a:effectRef idx="0">
-            <a:schemeClr val="accent1"/>
-          </a:effectRef>
-          <a:fontRef idx="minor">
-            <a:schemeClr val="lt1"/>
-          </a:fontRef>
-        </p:style>
-        <p:txBody>
-          <a:bodyPr rtlCol="0" anchor="ctr"/>
-          <a:lstStyle/>
-          <a:p>
-            <a:pPr algn="ctr"/>
-            <a:endParaRPr lang="en-AU"/>
-          </a:p>
-        </p:txBody>
-      </p:sp>
-      <p:sp>
-        <p:nvSpPr>
-          <p:cNvPr id="12" name="TextBox 11">
-            <a:extLst>
-              <a:ext uri="{FF2B5EF4-FFF2-40B4-BE49-F238E27FC236}">
-                <a16:creationId xmlns:a16="http://schemas.microsoft.com/office/drawing/2014/main" id="{4B6B2D29-603C-3AFD-7C8F-84CEB37E33E0}"/>
-              </a:ext>
-            </a:extLst>
-          </p:cNvPr>
-          <p:cNvSpPr txBox="1"/>
-          <p:nvPr/>
-        </p:nvSpPr>
-        <p:spPr>
-          <a:xfrm>
-            <a:off x="8535449" y="3763521"/>
-            <a:ext cx="725968" cy="369332"/>
-          </a:xfrm>
-          <a:prstGeom prst="rect">
-            <a:avLst/>
-          </a:prstGeom>
-          <a:noFill/>
-        </p:spPr>
-        <p:txBody>
-          <a:bodyPr wrap="none" rtlCol="0">
-            <a:spAutoFit/>
-          </a:bodyPr>
-          <a:lstStyle/>
-          <a:p>
-            <a:r>
-              <a:rPr lang="en-US" dirty="0"/>
-              <a:t>Client</a:t>
-            </a:r>
-            <a:endParaRPr lang="en-AU" dirty="0"/>
-          </a:p>
-        </p:txBody>
-      </p:sp>
-      <p:sp>
-        <p:nvSpPr>
-          <p:cNvPr id="13" name="Rectangle 12">
-            <a:extLst>
-              <a:ext uri="{FF2B5EF4-FFF2-40B4-BE49-F238E27FC236}">
-                <a16:creationId xmlns:a16="http://schemas.microsoft.com/office/drawing/2014/main" id="{B1F59E71-8F1F-F688-33E5-6A460C2042B7}"/>
-              </a:ext>
-            </a:extLst>
-          </p:cNvPr>
-          <p:cNvSpPr/>
-          <p:nvPr/>
-        </p:nvSpPr>
-        <p:spPr>
-          <a:xfrm>
-            <a:off x="6849374" y="2930980"/>
+            <a:off x="7148212" y="3023237"/>
             <a:ext cx="2717321" cy="365409"/>
           </a:xfrm>
           <a:prstGeom prst="rect">
@@ -4338,7 +4178,7 @@
             <a:pPr algn="ctr"/>
             <a:r>
               <a:rPr lang="en-US" dirty="0"/>
-              <a:t>NAVBAR AND Client Logged in page</a:t>
+              <a:t>NAVBAR Dashboard page</a:t>
             </a:r>
             <a:endParaRPr lang="en-AU" dirty="0"/>
           </a:p>
@@ -4394,8 +4234,8 @@
         </p:nvSpPr>
         <p:spPr>
           <a:xfrm>
-            <a:off x="224287" y="1138687"/>
-            <a:ext cx="1811547" cy="646331"/>
+            <a:off x="395301" y="1168879"/>
+            <a:ext cx="1811547" cy="923330"/>
           </a:xfrm>
           <a:prstGeom prst="rect">
             <a:avLst/>
@@ -4408,9 +4248,10 @@
           </a:bodyPr>
           <a:lstStyle/>
           <a:p>
-            <a:r>
-              <a:rPr lang="en-US" dirty="0"/>
-              <a:t>My Appointments</a:t>
+            <a:pPr algn="ctr"/>
+            <a:r>
+              <a:rPr lang="en-US" dirty="0"/>
+              <a:t>Clients booked appointments in order of date</a:t>
             </a:r>
             <a:endParaRPr lang="en-AU" dirty="0"/>
           </a:p>
@@ -4465,10 +4306,46 @@
       </p:sp>
       <p:sp>
         <p:nvSpPr>
-          <p:cNvPr id="7" name="Rectangle 6">
-            <a:extLst>
-              <a:ext uri="{FF2B5EF4-FFF2-40B4-BE49-F238E27FC236}">
-                <a16:creationId xmlns:a16="http://schemas.microsoft.com/office/drawing/2014/main" id="{20D9F513-3B02-11D9-13B9-DA997428E21D}"/>
+          <p:cNvPr id="8" name="TextBox 7">
+            <a:extLst>
+              <a:ext uri="{FF2B5EF4-FFF2-40B4-BE49-F238E27FC236}">
+                <a16:creationId xmlns:a16="http://schemas.microsoft.com/office/drawing/2014/main" id="{1AC825D1-CFC9-CE84-75A7-00D03F9A0694}"/>
+              </a:ext>
+            </a:extLst>
+          </p:cNvPr>
+          <p:cNvSpPr txBox="1"/>
+          <p:nvPr/>
+        </p:nvSpPr>
+        <p:spPr>
+          <a:xfrm>
+            <a:off x="10731262" y="355894"/>
+            <a:ext cx="1897812" cy="369332"/>
+          </a:xfrm>
+          <a:prstGeom prst="rect">
+            <a:avLst/>
+          </a:prstGeom>
+          <a:noFill/>
+        </p:spPr>
+        <p:txBody>
+          <a:bodyPr wrap="square" rtlCol="0">
+            <a:spAutoFit/>
+          </a:bodyPr>
+          <a:lstStyle/>
+          <a:p>
+            <a:r>
+              <a:rPr lang="en-US" dirty="0"/>
+              <a:t>Sign-out</a:t>
+            </a:r>
+            <a:endParaRPr lang="en-AU" dirty="0"/>
+          </a:p>
+        </p:txBody>
+      </p:sp>
+      <p:sp>
+        <p:nvSpPr>
+          <p:cNvPr id="13" name="Rectangle: Rounded Corners 12">
+            <a:extLst>
+              <a:ext uri="{FF2B5EF4-FFF2-40B4-BE49-F238E27FC236}">
+                <a16:creationId xmlns:a16="http://schemas.microsoft.com/office/drawing/2014/main" id="{15143FC6-45E8-9DF4-FDA4-9355C78B56CA}"/>
               </a:ext>
             </a:extLst>
           </p:cNvPr>
@@ -4477,10 +4354,10 @@
         </p:nvSpPr>
         <p:spPr>
           <a:xfrm>
-            <a:off x="2679031" y="1168879"/>
-            <a:ext cx="9149222" cy="2260121"/>
-          </a:xfrm>
-          <a:prstGeom prst="rect">
+            <a:off x="395301" y="3810933"/>
+            <a:ext cx="1811547" cy="2641091"/>
+          </a:xfrm>
+          <a:prstGeom prst="roundRect">
             <a:avLst/>
           </a:prstGeom>
         </p:spPr>
@@ -4507,14 +4384,14 @@
             <a:pPr algn="ctr"/>
             <a:r>
               <a:rPr lang="en-US" dirty="0"/>
-              <a:t>Hero Banner</a:t>
-            </a:r>
-          </a:p>
-          <a:p>
-            <a:pPr algn="ctr"/>
-            <a:r>
-              <a:rPr lang="en-US" dirty="0"/>
-              <a:t>Find the perfect professional</a:t>
+              <a:t>30-day calendar which circles the day when appointments are booked</a:t>
+            </a:r>
+          </a:p>
+          <a:p>
+            <a:pPr algn="ctr"/>
+            <a:r>
+              <a:rPr lang="en-US" dirty="0"/>
+              <a:t>When click on day it opens appointment</a:t>
             </a:r>
             <a:endParaRPr lang="en-AU" dirty="0"/>
           </a:p>
@@ -4522,46 +4399,10 @@
       </p:sp>
       <p:sp>
         <p:nvSpPr>
-          <p:cNvPr id="8" name="TextBox 7">
-            <a:extLst>
-              <a:ext uri="{FF2B5EF4-FFF2-40B4-BE49-F238E27FC236}">
-                <a16:creationId xmlns:a16="http://schemas.microsoft.com/office/drawing/2014/main" id="{1AC825D1-CFC9-CE84-75A7-00D03F9A0694}"/>
-              </a:ext>
-            </a:extLst>
-          </p:cNvPr>
-          <p:cNvSpPr txBox="1"/>
-          <p:nvPr/>
-        </p:nvSpPr>
-        <p:spPr>
-          <a:xfrm>
-            <a:off x="10731262" y="355894"/>
-            <a:ext cx="1897812" cy="369332"/>
-          </a:xfrm>
-          <a:prstGeom prst="rect">
-            <a:avLst/>
-          </a:prstGeom>
-          <a:noFill/>
-        </p:spPr>
-        <p:txBody>
-          <a:bodyPr wrap="square" rtlCol="0">
-            <a:spAutoFit/>
-          </a:bodyPr>
-          <a:lstStyle/>
-          <a:p>
-            <a:r>
-              <a:rPr lang="en-US" dirty="0"/>
-              <a:t>Sign-out</a:t>
-            </a:r>
-            <a:endParaRPr lang="en-AU" dirty="0"/>
-          </a:p>
-        </p:txBody>
-      </p:sp>
-      <p:sp>
-        <p:nvSpPr>
-          <p:cNvPr id="12" name="Rectangle 11">
-            <a:extLst>
-              <a:ext uri="{FF2B5EF4-FFF2-40B4-BE49-F238E27FC236}">
-                <a16:creationId xmlns:a16="http://schemas.microsoft.com/office/drawing/2014/main" id="{F7663469-93D2-7572-A1A3-1F1F2AD88F51}"/>
+          <p:cNvPr id="14" name="Rectangle 13">
+            <a:extLst>
+              <a:ext uri="{FF2B5EF4-FFF2-40B4-BE49-F238E27FC236}">
+                <a16:creationId xmlns:a16="http://schemas.microsoft.com/office/drawing/2014/main" id="{3415BD39-86DE-3553-5885-6A329C95952C}"/>
               </a:ext>
             </a:extLst>
           </p:cNvPr>
@@ -4570,8 +4411,8 @@
         </p:nvSpPr>
         <p:spPr>
           <a:xfrm>
-            <a:off x="3569368" y="3811467"/>
-            <a:ext cx="7368548" cy="770021"/>
+            <a:off x="2999874" y="5125359"/>
+            <a:ext cx="8507536" cy="1540043"/>
           </a:xfrm>
           <a:prstGeom prst="rect">
             <a:avLst/>
@@ -4600,7 +4441,7 @@
             <a:pPr algn="ctr"/>
             <a:r>
               <a:rPr lang="en-US" dirty="0"/>
-              <a:t>Search bar</a:t>
+              <a:t>My most recent clients</a:t>
             </a:r>
             <a:endParaRPr lang="en-AU" dirty="0"/>
           </a:p>
@@ -4608,10 +4449,10 @@
       </p:sp>
       <p:sp>
         <p:nvSpPr>
-          <p:cNvPr id="13" name="Rectangle: Rounded Corners 12">
-            <a:extLst>
-              <a:ext uri="{FF2B5EF4-FFF2-40B4-BE49-F238E27FC236}">
-                <a16:creationId xmlns:a16="http://schemas.microsoft.com/office/drawing/2014/main" id="{15143FC6-45E8-9DF4-FDA4-9355C78B56CA}"/>
+          <p:cNvPr id="15" name="Rectangle 14">
+            <a:extLst>
+              <a:ext uri="{FF2B5EF4-FFF2-40B4-BE49-F238E27FC236}">
+                <a16:creationId xmlns:a16="http://schemas.microsoft.com/office/drawing/2014/main" id="{DBB4E2C4-2AE9-A810-A9AB-D499FF4A6CD5}"/>
               </a:ext>
             </a:extLst>
           </p:cNvPr>
@@ -4620,12 +4461,15 @@
         </p:nvSpPr>
         <p:spPr>
           <a:xfrm>
-            <a:off x="327804" y="3811467"/>
-            <a:ext cx="1811547" cy="2641091"/>
-          </a:xfrm>
-          <a:prstGeom prst="roundRect">
+            <a:off x="3634898" y="5635429"/>
+            <a:ext cx="1876927" cy="519901"/>
+          </a:xfrm>
+          <a:prstGeom prst="rect">
             <a:avLst/>
           </a:prstGeom>
+          <a:solidFill>
+            <a:schemeClr val="accent2"/>
+          </a:solidFill>
         </p:spPr>
         <p:style>
           <a:lnRef idx="2">
@@ -4650,14 +4494,14 @@
             <a:pPr algn="ctr"/>
             <a:r>
               <a:rPr lang="en-US" dirty="0"/>
-              <a:t>30 day calendar which circles the day when appointments are booked</a:t>
-            </a:r>
-          </a:p>
-          <a:p>
-            <a:pPr algn="ctr"/>
-            <a:r>
-              <a:rPr lang="en-US" dirty="0"/>
-              <a:t>When click on day it opens appointment</a:t>
+              <a:t>Name</a:t>
+            </a:r>
+          </a:p>
+          <a:p>
+            <a:pPr algn="ctr"/>
+            <a:r>
+              <a:rPr lang="en-US" dirty="0"/>
+              <a:t>Profession</a:t>
             </a:r>
             <a:endParaRPr lang="en-AU" dirty="0"/>
           </a:p>
@@ -4665,10 +4509,10 @@
       </p:sp>
       <p:sp>
         <p:nvSpPr>
-          <p:cNvPr id="14" name="Rectangle 13">
-            <a:extLst>
-              <a:ext uri="{FF2B5EF4-FFF2-40B4-BE49-F238E27FC236}">
-                <a16:creationId xmlns:a16="http://schemas.microsoft.com/office/drawing/2014/main" id="{3415BD39-86DE-3553-5885-6A329C95952C}"/>
+          <p:cNvPr id="7" name="Rectangle 6">
+            <a:extLst>
+              <a:ext uri="{FF2B5EF4-FFF2-40B4-BE49-F238E27FC236}">
+                <a16:creationId xmlns:a16="http://schemas.microsoft.com/office/drawing/2014/main" id="{AD0904E9-D9A5-7706-90E8-80E40A6812CF}"/>
               </a:ext>
             </a:extLst>
           </p:cNvPr>
@@ -4677,8 +4521,8 @@
         </p:nvSpPr>
         <p:spPr>
           <a:xfrm>
-            <a:off x="2999874" y="4796589"/>
-            <a:ext cx="8507536" cy="1540043"/>
+            <a:off x="3375878" y="4347713"/>
+            <a:ext cx="2394966" cy="588908"/>
           </a:xfrm>
           <a:prstGeom prst="rect">
             <a:avLst/>
@@ -4707,7 +4551,7 @@
             <a:pPr algn="ctr"/>
             <a:r>
               <a:rPr lang="en-US" dirty="0"/>
-              <a:t>My Professionals</a:t>
+              <a:t>Book Appointment</a:t>
             </a:r>
             <a:endParaRPr lang="en-AU" dirty="0"/>
           </a:p>
@@ -4715,10 +4559,10 @@
       </p:sp>
       <p:sp>
         <p:nvSpPr>
-          <p:cNvPr id="15" name="Rectangle 14">
-            <a:extLst>
-              <a:ext uri="{FF2B5EF4-FFF2-40B4-BE49-F238E27FC236}">
-                <a16:creationId xmlns:a16="http://schemas.microsoft.com/office/drawing/2014/main" id="{DBB4E2C4-2AE9-A810-A9AB-D499FF4A6CD5}"/>
+          <p:cNvPr id="19" name="Rectangle 18">
+            <a:extLst>
+              <a:ext uri="{FF2B5EF4-FFF2-40B4-BE49-F238E27FC236}">
+                <a16:creationId xmlns:a16="http://schemas.microsoft.com/office/drawing/2014/main" id="{9905C6E2-7B0A-3CAF-36B5-7E54807BDE87}"/>
               </a:ext>
             </a:extLst>
           </p:cNvPr>
@@ -4727,15 +4571,12 @@
         </p:nvSpPr>
         <p:spPr>
           <a:xfrm>
-            <a:off x="3272589" y="5053262"/>
-            <a:ext cx="1876927" cy="519901"/>
+            <a:off x="8336296" y="4434494"/>
+            <a:ext cx="2394966" cy="588908"/>
           </a:xfrm>
           <a:prstGeom prst="rect">
             <a:avLst/>
           </a:prstGeom>
-          <a:solidFill>
-            <a:schemeClr val="accent2"/>
-          </a:solidFill>
         </p:spPr>
         <p:style>
           <a:lnRef idx="2">
@@ -4758,25 +4599,124 @@
           <a:lstStyle/>
           <a:p>
             <a:pPr algn="ctr"/>
-            <a:r>
-              <a:rPr lang="en-US" dirty="0"/>
-              <a:t>Name</a:t>
-            </a:r>
-          </a:p>
-          <a:p>
-            <a:pPr algn="ctr"/>
-            <a:r>
-              <a:rPr lang="en-US" dirty="0"/>
-              <a:t>Profession</a:t>
-            </a:r>
+            <a:endParaRPr lang="en-US" dirty="0"/>
+          </a:p>
+          <a:p>
+            <a:pPr algn="ctr"/>
+            <a:r>
+              <a:rPr lang="en-US" dirty="0"/>
+              <a:t>Update profile</a:t>
+            </a:r>
+          </a:p>
+          <a:p>
+            <a:pPr algn="ctr"/>
             <a:endParaRPr lang="en-AU" dirty="0"/>
+          </a:p>
+        </p:txBody>
+      </p:sp>
+      <p:sp>
+        <p:nvSpPr>
+          <p:cNvPr id="20" name="Rectangle 19">
+            <a:extLst>
+              <a:ext uri="{FF2B5EF4-FFF2-40B4-BE49-F238E27FC236}">
+                <a16:creationId xmlns:a16="http://schemas.microsoft.com/office/drawing/2014/main" id="{37FFEE0D-BB45-651F-A51B-075A830245B5}"/>
+              </a:ext>
+            </a:extLst>
+          </p:cNvPr>
+          <p:cNvSpPr/>
+          <p:nvPr/>
+        </p:nvSpPr>
+        <p:spPr>
+          <a:xfrm>
+            <a:off x="9178506" y="264515"/>
+            <a:ext cx="1362974" cy="552090"/>
+          </a:xfrm>
+          <a:prstGeom prst="rect">
+            <a:avLst/>
+          </a:prstGeom>
+        </p:spPr>
+        <p:style>
+          <a:lnRef idx="2">
+            <a:schemeClr val="accent1">
+              <a:shade val="50000"/>
+            </a:schemeClr>
+          </a:lnRef>
+          <a:fillRef idx="1">
+            <a:schemeClr val="accent1"/>
+          </a:fillRef>
+          <a:effectRef idx="0">
+            <a:schemeClr val="accent1"/>
+          </a:effectRef>
+          <a:fontRef idx="minor">
+            <a:schemeClr val="lt1"/>
+          </a:fontRef>
+        </p:style>
+        <p:txBody>
+          <a:bodyPr rtlCol="0" anchor="ctr"/>
+          <a:lstStyle/>
+          <a:p>
+            <a:pPr algn="ctr"/>
+            <a:r>
+              <a:rPr lang="en-US" dirty="0"/>
+              <a:t>Search for a professional</a:t>
+            </a:r>
+            <a:endParaRPr lang="en-AU" dirty="0"/>
+          </a:p>
+        </p:txBody>
+      </p:sp>
+      <p:sp>
+        <p:nvSpPr>
+          <p:cNvPr id="24" name="Rectangle 23">
+            <a:extLst>
+              <a:ext uri="{FF2B5EF4-FFF2-40B4-BE49-F238E27FC236}">
+                <a16:creationId xmlns:a16="http://schemas.microsoft.com/office/drawing/2014/main" id="{D7712639-B9EF-D82F-88D9-CB3633CE086B}"/>
+              </a:ext>
+            </a:extLst>
+          </p:cNvPr>
+          <p:cNvSpPr/>
+          <p:nvPr/>
+        </p:nvSpPr>
+        <p:spPr>
+          <a:xfrm>
+            <a:off x="3375879" y="1483743"/>
+            <a:ext cx="7355384" cy="2353898"/>
+          </a:xfrm>
+          <a:prstGeom prst="rect">
+            <a:avLst/>
+          </a:prstGeom>
+        </p:spPr>
+        <p:style>
+          <a:lnRef idx="2">
+            <a:schemeClr val="accent1">
+              <a:shade val="50000"/>
+            </a:schemeClr>
+          </a:lnRef>
+          <a:fillRef idx="1">
+            <a:schemeClr val="accent1"/>
+          </a:fillRef>
+          <a:effectRef idx="0">
+            <a:schemeClr val="accent1"/>
+          </a:effectRef>
+          <a:fontRef idx="minor">
+            <a:schemeClr val="lt1"/>
+          </a:fontRef>
+        </p:style>
+        <p:txBody>
+          <a:bodyPr rtlCol="0" anchor="ctr"/>
+          <a:lstStyle/>
+          <a:p>
+            <a:pPr algn="ctr"/>
+            <a:r>
+              <a:rPr lang="en-US" dirty="0"/>
+              <a:t>Fin Services</a:t>
+            </a:r>
           </a:p>
         </p:txBody>
       </p:sp>
     </p:spTree>
     <p:extLst>
       <p:ext uri="{BB962C8B-B14F-4D97-AF65-F5344CB8AC3E}">
-        <p14:creationId xmlns:p14="http://schemas.microsoft.com/office/powerpoint/2010/main" val="2610398790"/>
+        <p14:creationId xmlns:p14="http://schemas.microsoft.com/office/powerpoint/2010/main" val="3053699438"/>
       </p:ext>
     </p:extLst>
   </p:cSld>
@@ -5137,34 +5077,20 @@
           </a:p>
           <a:p>
             <a:pPr algn="ctr"/>
-            <a:r>
-              <a:rPr lang="en-US" dirty="0"/>
-              <a:t>Photo</a:t>
-            </a:r>
-          </a:p>
-          <a:p>
-            <a:pPr algn="ctr"/>
             <a:endParaRPr lang="en-US" dirty="0"/>
           </a:p>
           <a:p>
             <a:pPr algn="ctr"/>
             <a:r>
               <a:rPr lang="en-US" dirty="0"/>
+              <a:t>Title of service</a:t>
+            </a:r>
+          </a:p>
+          <a:p>
+            <a:pPr algn="ctr"/>
+            <a:r>
+              <a:rPr lang="en-US" dirty="0"/>
               <a:t>Description</a:t>
-            </a:r>
-          </a:p>
-          <a:p>
-            <a:pPr algn="ctr"/>
-            <a:r>
-              <a:rPr lang="en-US" dirty="0"/>
-              <a:t>(future dev-rating)</a:t>
-            </a:r>
-          </a:p>
-          <a:p>
-            <a:pPr algn="ctr"/>
-            <a:r>
-              <a:rPr lang="en-US" dirty="0"/>
-              <a:t>Offers hourly, flat and Subscription</a:t>
             </a:r>
           </a:p>
         </p:txBody>
@@ -5225,34 +5151,20 @@
           </a:p>
           <a:p>
             <a:pPr algn="ctr"/>
-            <a:r>
-              <a:rPr lang="en-US" dirty="0"/>
-              <a:t>Photo</a:t>
-            </a:r>
-          </a:p>
-          <a:p>
-            <a:pPr algn="ctr"/>
             <a:endParaRPr lang="en-US" dirty="0"/>
           </a:p>
           <a:p>
             <a:pPr algn="ctr"/>
             <a:r>
               <a:rPr lang="en-US" dirty="0"/>
+              <a:t>Title of service</a:t>
+            </a:r>
+          </a:p>
+          <a:p>
+            <a:pPr algn="ctr"/>
+            <a:r>
+              <a:rPr lang="en-US" dirty="0"/>
               <a:t>Description</a:t>
-            </a:r>
-          </a:p>
-          <a:p>
-            <a:pPr algn="ctr"/>
-            <a:r>
-              <a:rPr lang="en-US" dirty="0"/>
-              <a:t>(future dev-rating)</a:t>
-            </a:r>
-          </a:p>
-          <a:p>
-            <a:pPr algn="ctr"/>
-            <a:r>
-              <a:rPr lang="en-US" dirty="0"/>
-              <a:t>Offers hourly, flat and Subscription</a:t>
             </a:r>
           </a:p>
         </p:txBody>
@@ -5313,34 +5225,20 @@
           </a:p>
           <a:p>
             <a:pPr algn="ctr"/>
-            <a:r>
-              <a:rPr lang="en-US" dirty="0"/>
-              <a:t>Photo</a:t>
-            </a:r>
-          </a:p>
-          <a:p>
-            <a:pPr algn="ctr"/>
             <a:endParaRPr lang="en-US" dirty="0"/>
           </a:p>
           <a:p>
             <a:pPr algn="ctr"/>
             <a:r>
               <a:rPr lang="en-US" dirty="0"/>
+              <a:t>Title of service</a:t>
+            </a:r>
+          </a:p>
+          <a:p>
+            <a:pPr algn="ctr"/>
+            <a:r>
+              <a:rPr lang="en-US" dirty="0"/>
               <a:t>Description</a:t>
-            </a:r>
-          </a:p>
-          <a:p>
-            <a:pPr algn="ctr"/>
-            <a:r>
-              <a:rPr lang="en-US" dirty="0"/>
-              <a:t>(future dev-rating)</a:t>
-            </a:r>
-          </a:p>
-          <a:p>
-            <a:pPr algn="ctr"/>
-            <a:r>
-              <a:rPr lang="en-US" dirty="0"/>
-              <a:t>Offers hourly, flat and Subscription</a:t>
             </a:r>
           </a:p>
         </p:txBody>
@@ -5401,34 +5299,20 @@
           </a:p>
           <a:p>
             <a:pPr algn="ctr"/>
-            <a:r>
-              <a:rPr lang="en-US" dirty="0"/>
-              <a:t>Photo</a:t>
-            </a:r>
-          </a:p>
-          <a:p>
-            <a:pPr algn="ctr"/>
             <a:endParaRPr lang="en-US" dirty="0"/>
           </a:p>
           <a:p>
             <a:pPr algn="ctr"/>
             <a:r>
               <a:rPr lang="en-US" dirty="0"/>
+              <a:t>Title of service</a:t>
+            </a:r>
+          </a:p>
+          <a:p>
+            <a:pPr algn="ctr"/>
+            <a:r>
+              <a:rPr lang="en-US" dirty="0"/>
               <a:t>Description</a:t>
-            </a:r>
-          </a:p>
-          <a:p>
-            <a:pPr algn="ctr"/>
-            <a:r>
-              <a:rPr lang="en-US" dirty="0"/>
-              <a:t>(future dev-rating)</a:t>
-            </a:r>
-          </a:p>
-          <a:p>
-            <a:pPr algn="ctr"/>
-            <a:r>
-              <a:rPr lang="en-US" dirty="0"/>
-              <a:t>Offers hourly, flat and Subscription</a:t>
             </a:r>
           </a:p>
         </p:txBody>
@@ -5489,34 +5373,20 @@
           </a:p>
           <a:p>
             <a:pPr algn="ctr"/>
-            <a:r>
-              <a:rPr lang="en-US" dirty="0"/>
-              <a:t>Photo</a:t>
-            </a:r>
-          </a:p>
-          <a:p>
-            <a:pPr algn="ctr"/>
             <a:endParaRPr lang="en-US" dirty="0"/>
           </a:p>
           <a:p>
             <a:pPr algn="ctr"/>
             <a:r>
               <a:rPr lang="en-US" dirty="0"/>
+              <a:t>Title of service</a:t>
+            </a:r>
+          </a:p>
+          <a:p>
+            <a:pPr algn="ctr"/>
+            <a:r>
+              <a:rPr lang="en-US" dirty="0"/>
               <a:t>Description</a:t>
-            </a:r>
-          </a:p>
-          <a:p>
-            <a:pPr algn="ctr"/>
-            <a:r>
-              <a:rPr lang="en-US" dirty="0"/>
-              <a:t>(future dev-rating)</a:t>
-            </a:r>
-          </a:p>
-          <a:p>
-            <a:pPr algn="ctr"/>
-            <a:r>
-              <a:rPr lang="en-US" dirty="0"/>
-              <a:t>Offers hourly, flat and Subscription</a:t>
             </a:r>
           </a:p>
         </p:txBody>
@@ -5577,35 +5447,25 @@
           </a:p>
           <a:p>
             <a:pPr algn="ctr"/>
-            <a:r>
-              <a:rPr lang="en-US" dirty="0"/>
-              <a:t>Photo</a:t>
-            </a:r>
-          </a:p>
-          <a:p>
-            <a:pPr algn="ctr"/>
             <a:endParaRPr lang="en-US" dirty="0"/>
           </a:p>
           <a:p>
             <a:pPr algn="ctr"/>
             <a:r>
               <a:rPr lang="en-US" dirty="0"/>
+              <a:t>Title of service</a:t>
+            </a:r>
+          </a:p>
+          <a:p>
+            <a:pPr algn="ctr"/>
+            <a:r>
+              <a:rPr lang="en-US" dirty="0"/>
               <a:t>Description</a:t>
             </a:r>
           </a:p>
           <a:p>
             <a:pPr algn="ctr"/>
-            <a:r>
-              <a:rPr lang="en-US" dirty="0"/>
-              <a:t>(future dev-rating)</a:t>
-            </a:r>
-          </a:p>
-          <a:p>
-            <a:pPr algn="ctr"/>
-            <a:r>
-              <a:rPr lang="en-US" dirty="0"/>
-              <a:t>Offers hourly, flat and Subscription</a:t>
-            </a:r>
+            <a:endParaRPr lang="en-US" dirty="0"/>
           </a:p>
         </p:txBody>
       </p:sp>
@@ -5665,34 +5525,20 @@
           </a:p>
           <a:p>
             <a:pPr algn="ctr"/>
-            <a:r>
-              <a:rPr lang="en-US" dirty="0"/>
-              <a:t>Photo</a:t>
-            </a:r>
-          </a:p>
-          <a:p>
-            <a:pPr algn="ctr"/>
             <a:endParaRPr lang="en-US" dirty="0"/>
           </a:p>
           <a:p>
             <a:pPr algn="ctr"/>
             <a:r>
               <a:rPr lang="en-US" dirty="0"/>
+              <a:t>Title of service</a:t>
+            </a:r>
+          </a:p>
+          <a:p>
+            <a:pPr algn="ctr"/>
+            <a:r>
+              <a:rPr lang="en-US" dirty="0"/>
               <a:t>Description</a:t>
-            </a:r>
-          </a:p>
-          <a:p>
-            <a:pPr algn="ctr"/>
-            <a:r>
-              <a:rPr lang="en-US" dirty="0"/>
-              <a:t>(future dev-rating)</a:t>
-            </a:r>
-          </a:p>
-          <a:p>
-            <a:pPr algn="ctr"/>
-            <a:r>
-              <a:rPr lang="en-US" dirty="0"/>
-              <a:t>Offers hourly, flat and Subscription</a:t>
             </a:r>
           </a:p>
         </p:txBody>
@@ -5753,34 +5599,20 @@
           </a:p>
           <a:p>
             <a:pPr algn="ctr"/>
-            <a:r>
-              <a:rPr lang="en-US" dirty="0"/>
-              <a:t>Photo</a:t>
-            </a:r>
-          </a:p>
-          <a:p>
-            <a:pPr algn="ctr"/>
             <a:endParaRPr lang="en-US" dirty="0"/>
           </a:p>
           <a:p>
             <a:pPr algn="ctr"/>
             <a:r>
               <a:rPr lang="en-US" dirty="0"/>
+              <a:t>Title of service</a:t>
+            </a:r>
+          </a:p>
+          <a:p>
+            <a:pPr algn="ctr"/>
+            <a:r>
+              <a:rPr lang="en-US" dirty="0"/>
               <a:t>Description</a:t>
-            </a:r>
-          </a:p>
-          <a:p>
-            <a:pPr algn="ctr"/>
-            <a:r>
-              <a:rPr lang="en-US" dirty="0"/>
-              <a:t>(future dev-rating)</a:t>
-            </a:r>
-          </a:p>
-          <a:p>
-            <a:pPr algn="ctr"/>
-            <a:r>
-              <a:rPr lang="en-US" dirty="0"/>
-              <a:t>Offers hourly, flat and Subscription</a:t>
             </a:r>
           </a:p>
         </p:txBody>
@@ -5829,7 +5661,7 @@
         </p:nvSpPr>
         <p:spPr>
           <a:xfrm>
-            <a:off x="641684" y="1219200"/>
+            <a:off x="8471747" y="1300509"/>
             <a:ext cx="3208421" cy="4908884"/>
           </a:xfrm>
           <a:prstGeom prst="rect">
@@ -5885,9 +5717,8 @@
             <a:pPr algn="ctr"/>
             <a:r>
               <a:rPr lang="en-US" dirty="0"/>
-              <a:t>No appointments previously booked</a:t>
-            </a:r>
-            <a:endParaRPr lang="en-AU" dirty="0"/>
+              <a:t>No appointments previously booked don’t render in</a:t>
+            </a:r>
           </a:p>
         </p:txBody>
       </p:sp>
@@ -5905,7 +5736,7 @@
         </p:nvSpPr>
         <p:spPr>
           <a:xfrm>
-            <a:off x="4660234" y="4644189"/>
+            <a:off x="224287" y="4454048"/>
             <a:ext cx="6721637" cy="1483895"/>
           </a:xfrm>
           <a:prstGeom prst="rect">
@@ -5962,7 +5793,7 @@
         </p:nvSpPr>
         <p:spPr>
           <a:xfrm>
-            <a:off x="5871411" y="2155656"/>
+            <a:off x="224287" y="1662004"/>
             <a:ext cx="5510460" cy="661738"/>
           </a:xfrm>
           <a:prstGeom prst="rect">
@@ -6012,7 +5843,7 @@
         </p:nvSpPr>
         <p:spPr>
           <a:xfrm>
-            <a:off x="4981078" y="3097225"/>
+            <a:off x="224287" y="2843928"/>
             <a:ext cx="6400793" cy="1152834"/>
           </a:xfrm>
           <a:prstGeom prst="rect">
@@ -6102,7 +5933,7 @@
             <a:pPr algn="ctr"/>
             <a:r>
               <a:rPr lang="en-US" dirty="0"/>
-              <a:t>NAVBAR AND Professional booking page</a:t>
+              <a:t>NAVBAR AND Professional booking profile</a:t>
             </a:r>
             <a:endParaRPr lang="en-AU" dirty="0"/>
           </a:p>
@@ -6183,564 +6014,7 @@
     </p:spTree>
     <p:extLst>
       <p:ext uri="{BB962C8B-B14F-4D97-AF65-F5344CB8AC3E}">
-        <p14:creationId xmlns:p14="http://schemas.microsoft.com/office/powerpoint/2010/main" val="1299410851"/>
-      </p:ext>
-    </p:extLst>
-  </p:cSld>
-  <p:clrMapOvr>
-    <a:masterClrMapping/>
-  </p:clrMapOvr>
-</p:sld>
-</file>
-
-<file path=ppt/slides/slide6.xml><?xml version="1.0" encoding="utf-8"?>
-<p:sld xmlns:a="http://schemas.openxmlformats.org/drawingml/2006/main" xmlns:r="http://schemas.openxmlformats.org/officeDocument/2006/relationships" xmlns:p="http://schemas.openxmlformats.org/presentationml/2006/main">
-  <p:cSld>
-    <p:spTree>
-      <p:nvGrpSpPr>
-        <p:cNvPr id="1" name=""/>
-        <p:cNvGrpSpPr/>
-        <p:nvPr/>
-      </p:nvGrpSpPr>
-      <p:grpSpPr>
-        <a:xfrm>
-          <a:off x="0" y="0"/>
-          <a:ext cx="0" cy="0"/>
-          <a:chOff x="0" y="0"/>
-          <a:chExt cx="0" cy="0"/>
-        </a:xfrm>
-      </p:grpSpPr>
-      <p:sp>
-        <p:nvSpPr>
-          <p:cNvPr id="2" name="Title 1">
-            <a:extLst>
-              <a:ext uri="{FF2B5EF4-FFF2-40B4-BE49-F238E27FC236}">
-                <a16:creationId xmlns:a16="http://schemas.microsoft.com/office/drawing/2014/main" id="{4105EEED-FFA5-6544-D87A-9A393D2CA70F}"/>
-              </a:ext>
-            </a:extLst>
-          </p:cNvPr>
-          <p:cNvSpPr>
-            <a:spLocks noGrp="1"/>
-          </p:cNvSpPr>
-          <p:nvPr>
-            <p:ph type="title"/>
-          </p:nvPr>
-        </p:nvSpPr>
-        <p:spPr>
-          <a:xfrm>
-            <a:off x="224287" y="192598"/>
-            <a:ext cx="11603966" cy="695924"/>
-          </a:xfrm>
-        </p:spPr>
-        <p:style>
-          <a:lnRef idx="2">
-            <a:schemeClr val="dk1"/>
-          </a:lnRef>
-          <a:fillRef idx="1">
-            <a:schemeClr val="lt1"/>
-          </a:fillRef>
-          <a:effectRef idx="0">
-            <a:schemeClr val="dk1"/>
-          </a:effectRef>
-          <a:fontRef idx="minor">
-            <a:schemeClr val="dk1"/>
-          </a:fontRef>
-        </p:style>
-        <p:txBody>
-          <a:bodyPr/>
-          <a:lstStyle/>
-          <a:p>
-            <a:pPr algn="ctr"/>
-            <a:r>
-              <a:rPr lang="en-US" dirty="0"/>
-              <a:t>NAVBAR AND Professional Logged in page</a:t>
-            </a:r>
-            <a:endParaRPr lang="en-AU" dirty="0"/>
-          </a:p>
-        </p:txBody>
-      </p:sp>
-      <p:sp>
-        <p:nvSpPr>
-          <p:cNvPr id="4" name="TextBox 3">
-            <a:extLst>
-              <a:ext uri="{FF2B5EF4-FFF2-40B4-BE49-F238E27FC236}">
-                <a16:creationId xmlns:a16="http://schemas.microsoft.com/office/drawing/2014/main" id="{89E14D60-8BB9-A058-175A-E332A8A4D060}"/>
-              </a:ext>
-            </a:extLst>
-          </p:cNvPr>
-          <p:cNvSpPr txBox="1"/>
-          <p:nvPr/>
-        </p:nvSpPr>
-        <p:spPr>
-          <a:xfrm>
-            <a:off x="327804" y="405442"/>
-            <a:ext cx="1475117" cy="369332"/>
-          </a:xfrm>
-          <a:prstGeom prst="rect">
-            <a:avLst/>
-          </a:prstGeom>
-          <a:noFill/>
-        </p:spPr>
-        <p:txBody>
-          <a:bodyPr wrap="square" rtlCol="0">
-            <a:spAutoFit/>
-          </a:bodyPr>
-          <a:lstStyle/>
-          <a:p>
-            <a:r>
-              <a:rPr lang="en-US" dirty="0"/>
-              <a:t>Logo</a:t>
-            </a:r>
-            <a:endParaRPr lang="en-AU" dirty="0"/>
-          </a:p>
-        </p:txBody>
-      </p:sp>
-      <p:sp>
-        <p:nvSpPr>
-          <p:cNvPr id="5" name="TextBox 4">
-            <a:extLst>
-              <a:ext uri="{FF2B5EF4-FFF2-40B4-BE49-F238E27FC236}">
-                <a16:creationId xmlns:a16="http://schemas.microsoft.com/office/drawing/2014/main" id="{DE946DB7-711C-3AD4-825A-0888CD4C89FB}"/>
-              </a:ext>
-            </a:extLst>
-          </p:cNvPr>
-          <p:cNvSpPr txBox="1"/>
-          <p:nvPr/>
-        </p:nvSpPr>
-        <p:spPr>
-          <a:xfrm>
-            <a:off x="224287" y="1138687"/>
-            <a:ext cx="1811547" cy="923330"/>
-          </a:xfrm>
-          <a:prstGeom prst="rect">
-            <a:avLst/>
-          </a:prstGeom>
-          <a:noFill/>
-        </p:spPr>
-        <p:txBody>
-          <a:bodyPr wrap="square" rtlCol="0">
-            <a:spAutoFit/>
-          </a:bodyPr>
-          <a:lstStyle/>
-          <a:p>
-            <a:r>
-              <a:rPr lang="en-US" dirty="0"/>
-              <a:t>Clients booked appointments in order of date</a:t>
-            </a:r>
-            <a:endParaRPr lang="en-AU" dirty="0"/>
-          </a:p>
-        </p:txBody>
-      </p:sp>
-      <p:sp>
-        <p:nvSpPr>
-          <p:cNvPr id="6" name="Rectangle 5">
-            <a:extLst>
-              <a:ext uri="{FF2B5EF4-FFF2-40B4-BE49-F238E27FC236}">
-                <a16:creationId xmlns:a16="http://schemas.microsoft.com/office/drawing/2014/main" id="{C98569DE-9194-D369-A164-301CC7F93840}"/>
-              </a:ext>
-            </a:extLst>
-          </p:cNvPr>
-          <p:cNvSpPr/>
-          <p:nvPr/>
-        </p:nvSpPr>
-        <p:spPr>
-          <a:xfrm>
-            <a:off x="276045" y="957532"/>
-            <a:ext cx="2050060" cy="5707870"/>
-          </a:xfrm>
-          <a:prstGeom prst="rect">
-            <a:avLst/>
-          </a:prstGeom>
-          <a:noFill/>
-        </p:spPr>
-        <p:style>
-          <a:lnRef idx="2">
-            <a:schemeClr val="accent1">
-              <a:shade val="50000"/>
-            </a:schemeClr>
-          </a:lnRef>
-          <a:fillRef idx="1">
-            <a:schemeClr val="accent1"/>
-          </a:fillRef>
-          <a:effectRef idx="0">
-            <a:schemeClr val="accent1"/>
-          </a:effectRef>
-          <a:fontRef idx="minor">
-            <a:schemeClr val="lt1"/>
-          </a:fontRef>
-        </p:style>
-        <p:txBody>
-          <a:bodyPr rtlCol="0" anchor="ctr"/>
-          <a:lstStyle/>
-          <a:p>
-            <a:pPr algn="ctr"/>
-            <a:endParaRPr lang="en-AU"/>
-          </a:p>
-        </p:txBody>
-      </p:sp>
-      <p:sp>
-        <p:nvSpPr>
-          <p:cNvPr id="8" name="TextBox 7">
-            <a:extLst>
-              <a:ext uri="{FF2B5EF4-FFF2-40B4-BE49-F238E27FC236}">
-                <a16:creationId xmlns:a16="http://schemas.microsoft.com/office/drawing/2014/main" id="{1AC825D1-CFC9-CE84-75A7-00D03F9A0694}"/>
-              </a:ext>
-            </a:extLst>
-          </p:cNvPr>
-          <p:cNvSpPr txBox="1"/>
-          <p:nvPr/>
-        </p:nvSpPr>
-        <p:spPr>
-          <a:xfrm>
-            <a:off x="10731262" y="355894"/>
-            <a:ext cx="1897812" cy="369332"/>
-          </a:xfrm>
-          <a:prstGeom prst="rect">
-            <a:avLst/>
-          </a:prstGeom>
-          <a:noFill/>
-        </p:spPr>
-        <p:txBody>
-          <a:bodyPr wrap="square" rtlCol="0">
-            <a:spAutoFit/>
-          </a:bodyPr>
-          <a:lstStyle/>
-          <a:p>
-            <a:r>
-              <a:rPr lang="en-US" dirty="0"/>
-              <a:t>Sign-out</a:t>
-            </a:r>
-            <a:endParaRPr lang="en-AU" dirty="0"/>
-          </a:p>
-        </p:txBody>
-      </p:sp>
-      <p:sp>
-        <p:nvSpPr>
-          <p:cNvPr id="12" name="Rectangle 11">
-            <a:extLst>
-              <a:ext uri="{FF2B5EF4-FFF2-40B4-BE49-F238E27FC236}">
-                <a16:creationId xmlns:a16="http://schemas.microsoft.com/office/drawing/2014/main" id="{F7663469-93D2-7572-A1A3-1F1F2AD88F51}"/>
-              </a:ext>
-            </a:extLst>
-          </p:cNvPr>
-          <p:cNvSpPr/>
-          <p:nvPr/>
-        </p:nvSpPr>
-        <p:spPr>
-          <a:xfrm>
-            <a:off x="3569368" y="3811467"/>
-            <a:ext cx="7368548" cy="770021"/>
-          </a:xfrm>
-          <a:prstGeom prst="rect">
-            <a:avLst/>
-          </a:prstGeom>
-        </p:spPr>
-        <p:style>
-          <a:lnRef idx="2">
-            <a:schemeClr val="accent1">
-              <a:shade val="50000"/>
-            </a:schemeClr>
-          </a:lnRef>
-          <a:fillRef idx="1">
-            <a:schemeClr val="accent1"/>
-          </a:fillRef>
-          <a:effectRef idx="0">
-            <a:schemeClr val="accent1"/>
-          </a:effectRef>
-          <a:fontRef idx="minor">
-            <a:schemeClr val="lt1"/>
-          </a:fontRef>
-        </p:style>
-        <p:txBody>
-          <a:bodyPr rtlCol="0" anchor="ctr"/>
-          <a:lstStyle/>
-          <a:p>
-            <a:pPr algn="ctr"/>
-            <a:r>
-              <a:rPr lang="en-US" dirty="0"/>
-              <a:t>Search bar for clients</a:t>
-            </a:r>
-            <a:endParaRPr lang="en-AU" dirty="0"/>
-          </a:p>
-        </p:txBody>
-      </p:sp>
-      <p:sp>
-        <p:nvSpPr>
-          <p:cNvPr id="13" name="Rectangle: Rounded Corners 12">
-            <a:extLst>
-              <a:ext uri="{FF2B5EF4-FFF2-40B4-BE49-F238E27FC236}">
-                <a16:creationId xmlns:a16="http://schemas.microsoft.com/office/drawing/2014/main" id="{15143FC6-45E8-9DF4-FDA4-9355C78B56CA}"/>
-              </a:ext>
-            </a:extLst>
-          </p:cNvPr>
-          <p:cNvSpPr/>
-          <p:nvPr/>
-        </p:nvSpPr>
-        <p:spPr>
-          <a:xfrm>
-            <a:off x="327804" y="3811467"/>
-            <a:ext cx="1811547" cy="2641091"/>
-          </a:xfrm>
-          <a:prstGeom prst="roundRect">
-            <a:avLst/>
-          </a:prstGeom>
-        </p:spPr>
-        <p:style>
-          <a:lnRef idx="2">
-            <a:schemeClr val="accent1">
-              <a:shade val="50000"/>
-            </a:schemeClr>
-          </a:lnRef>
-          <a:fillRef idx="1">
-            <a:schemeClr val="accent1"/>
-          </a:fillRef>
-          <a:effectRef idx="0">
-            <a:schemeClr val="accent1"/>
-          </a:effectRef>
-          <a:fontRef idx="minor">
-            <a:schemeClr val="lt1"/>
-          </a:fontRef>
-        </p:style>
-        <p:txBody>
-          <a:bodyPr rtlCol="0" anchor="ctr"/>
-          <a:lstStyle/>
-          <a:p>
-            <a:pPr algn="ctr"/>
-            <a:r>
-              <a:rPr lang="en-US" dirty="0"/>
-              <a:t>30 day calendar which circles the day when appointments are booked</a:t>
-            </a:r>
-          </a:p>
-          <a:p>
-            <a:pPr algn="ctr"/>
-            <a:r>
-              <a:rPr lang="en-US" dirty="0"/>
-              <a:t>When click on day it opens appointment</a:t>
-            </a:r>
-            <a:endParaRPr lang="en-AU" dirty="0"/>
-          </a:p>
-        </p:txBody>
-      </p:sp>
-      <p:sp>
-        <p:nvSpPr>
-          <p:cNvPr id="14" name="Rectangle 13">
-            <a:extLst>
-              <a:ext uri="{FF2B5EF4-FFF2-40B4-BE49-F238E27FC236}">
-                <a16:creationId xmlns:a16="http://schemas.microsoft.com/office/drawing/2014/main" id="{3415BD39-86DE-3553-5885-6A329C95952C}"/>
-              </a:ext>
-            </a:extLst>
-          </p:cNvPr>
-          <p:cNvSpPr/>
-          <p:nvPr/>
-        </p:nvSpPr>
-        <p:spPr>
-          <a:xfrm>
-            <a:off x="2999874" y="4796589"/>
-            <a:ext cx="8507536" cy="1540043"/>
-          </a:xfrm>
-          <a:prstGeom prst="rect">
-            <a:avLst/>
-          </a:prstGeom>
-        </p:spPr>
-        <p:style>
-          <a:lnRef idx="2">
-            <a:schemeClr val="accent1">
-              <a:shade val="50000"/>
-            </a:schemeClr>
-          </a:lnRef>
-          <a:fillRef idx="1">
-            <a:schemeClr val="accent1"/>
-          </a:fillRef>
-          <a:effectRef idx="0">
-            <a:schemeClr val="accent1"/>
-          </a:effectRef>
-          <a:fontRef idx="minor">
-            <a:schemeClr val="lt1"/>
-          </a:fontRef>
-        </p:style>
-        <p:txBody>
-          <a:bodyPr rtlCol="0" anchor="ctr"/>
-          <a:lstStyle/>
-          <a:p>
-            <a:pPr algn="ctr"/>
-            <a:r>
-              <a:rPr lang="en-US" dirty="0"/>
-              <a:t>My most recent clients</a:t>
-            </a:r>
-            <a:endParaRPr lang="en-AU" dirty="0"/>
-          </a:p>
-        </p:txBody>
-      </p:sp>
-      <p:sp>
-        <p:nvSpPr>
-          <p:cNvPr id="15" name="Rectangle 14">
-            <a:extLst>
-              <a:ext uri="{FF2B5EF4-FFF2-40B4-BE49-F238E27FC236}">
-                <a16:creationId xmlns:a16="http://schemas.microsoft.com/office/drawing/2014/main" id="{DBB4E2C4-2AE9-A810-A9AB-D499FF4A6CD5}"/>
-              </a:ext>
-            </a:extLst>
-          </p:cNvPr>
-          <p:cNvSpPr/>
-          <p:nvPr/>
-        </p:nvSpPr>
-        <p:spPr>
-          <a:xfrm>
-            <a:off x="3272589" y="5053262"/>
-            <a:ext cx="1876927" cy="519901"/>
-          </a:xfrm>
-          <a:prstGeom prst="rect">
-            <a:avLst/>
-          </a:prstGeom>
-          <a:solidFill>
-            <a:schemeClr val="accent2"/>
-          </a:solidFill>
-        </p:spPr>
-        <p:style>
-          <a:lnRef idx="2">
-            <a:schemeClr val="accent1">
-              <a:shade val="50000"/>
-            </a:schemeClr>
-          </a:lnRef>
-          <a:fillRef idx="1">
-            <a:schemeClr val="accent1"/>
-          </a:fillRef>
-          <a:effectRef idx="0">
-            <a:schemeClr val="accent1"/>
-          </a:effectRef>
-          <a:fontRef idx="minor">
-            <a:schemeClr val="lt1"/>
-          </a:fontRef>
-        </p:style>
-        <p:txBody>
-          <a:bodyPr rtlCol="0" anchor="ctr"/>
-          <a:lstStyle/>
-          <a:p>
-            <a:pPr algn="ctr"/>
-            <a:r>
-              <a:rPr lang="en-US" dirty="0"/>
-              <a:t>Name</a:t>
-            </a:r>
-          </a:p>
-          <a:p>
-            <a:pPr algn="ctr"/>
-            <a:r>
-              <a:rPr lang="en-US" dirty="0"/>
-              <a:t>Profession</a:t>
-            </a:r>
-            <a:endParaRPr lang="en-AU" dirty="0"/>
-          </a:p>
-        </p:txBody>
-      </p:sp>
-      <p:sp>
-        <p:nvSpPr>
-          <p:cNvPr id="3" name="Rectangle 2">
-            <a:extLst>
-              <a:ext uri="{FF2B5EF4-FFF2-40B4-BE49-F238E27FC236}">
-                <a16:creationId xmlns:a16="http://schemas.microsoft.com/office/drawing/2014/main" id="{E75922A2-D5A3-B550-9342-4F3F591868BC}"/>
-              </a:ext>
-            </a:extLst>
-          </p:cNvPr>
-          <p:cNvSpPr/>
-          <p:nvPr/>
-        </p:nvSpPr>
-        <p:spPr>
-          <a:xfrm>
-            <a:off x="2999874" y="1168879"/>
-            <a:ext cx="8828379" cy="1815861"/>
-          </a:xfrm>
-          <a:prstGeom prst="rect">
-            <a:avLst/>
-          </a:prstGeom>
-        </p:spPr>
-        <p:style>
-          <a:lnRef idx="2">
-            <a:schemeClr val="accent1">
-              <a:shade val="50000"/>
-            </a:schemeClr>
-          </a:lnRef>
-          <a:fillRef idx="1">
-            <a:schemeClr val="accent1"/>
-          </a:fillRef>
-          <a:effectRef idx="0">
-            <a:schemeClr val="accent1"/>
-          </a:effectRef>
-          <a:fontRef idx="minor">
-            <a:schemeClr val="lt1"/>
-          </a:fontRef>
-        </p:style>
-        <p:txBody>
-          <a:bodyPr rtlCol="0" anchor="ctr"/>
-          <a:lstStyle/>
-          <a:p>
-            <a:pPr algn="ctr"/>
-            <a:r>
-              <a:rPr lang="en-US" dirty="0"/>
-              <a:t>Add services</a:t>
-            </a:r>
-          </a:p>
-          <a:p>
-            <a:pPr algn="ctr"/>
-            <a:r>
-              <a:rPr lang="en-AU" dirty="0"/>
-              <a:t>(flat fee, Hourly, subscription)</a:t>
-            </a:r>
-          </a:p>
-        </p:txBody>
-      </p:sp>
-      <p:sp>
-        <p:nvSpPr>
-          <p:cNvPr id="9" name="Rectangle 8">
-            <a:extLst>
-              <a:ext uri="{FF2B5EF4-FFF2-40B4-BE49-F238E27FC236}">
-                <a16:creationId xmlns:a16="http://schemas.microsoft.com/office/drawing/2014/main" id="{6EA6D752-08B3-790C-DB9A-521741BBA00E}"/>
-              </a:ext>
-            </a:extLst>
-          </p:cNvPr>
-          <p:cNvSpPr/>
-          <p:nvPr/>
-        </p:nvSpPr>
-        <p:spPr>
-          <a:xfrm>
-            <a:off x="3114136" y="3105509"/>
-            <a:ext cx="8507536" cy="490857"/>
-          </a:xfrm>
-          <a:prstGeom prst="rect">
-            <a:avLst/>
-          </a:prstGeom>
-        </p:spPr>
-        <p:style>
-          <a:lnRef idx="2">
-            <a:schemeClr val="accent1">
-              <a:shade val="50000"/>
-            </a:schemeClr>
-          </a:lnRef>
-          <a:fillRef idx="1">
-            <a:schemeClr val="accent1"/>
-          </a:fillRef>
-          <a:effectRef idx="0">
-            <a:schemeClr val="accent1"/>
-          </a:effectRef>
-          <a:fontRef idx="minor">
-            <a:schemeClr val="lt1"/>
-          </a:fontRef>
-        </p:style>
-        <p:txBody>
-          <a:bodyPr rtlCol="0" anchor="ctr"/>
-          <a:lstStyle/>
-          <a:p>
-            <a:pPr algn="ctr"/>
-            <a:r>
-              <a:rPr lang="en-US" dirty="0"/>
-              <a:t>Financials(Link)</a:t>
-            </a:r>
-            <a:endParaRPr lang="en-AU" dirty="0"/>
-          </a:p>
-        </p:txBody>
-      </p:sp>
-    </p:spTree>
-    <p:extLst>
-      <p:ext uri="{BB962C8B-B14F-4D97-AF65-F5344CB8AC3E}">
-        <p14:creationId xmlns:p14="http://schemas.microsoft.com/office/powerpoint/2010/main" val="3053699438"/>
+        <p14:creationId xmlns:p14="http://schemas.microsoft.com/office/powerpoint/2010/main" val="346168065"/>
       </p:ext>
     </p:extLst>
   </p:cSld>

</xml_diff>